<commit_message>
Fixed bugs and editted UIClassDiagram
</commit_message>
<xml_diff>
--- a/docs/diagrams/UiComponentClassDiagram.pptx
+++ b/docs/diagrams/UiComponentClassDiagram.pptx
@@ -208,7 +208,7 @@
           <a:p>
             <a:fld id="{F5CC4B3F-88C1-4FFA-B1B6-F41C21DC6924}" type="datetimeFigureOut">
               <a:rPr lang="en-US" smtClean="0"/>
-              <a:t>3/17/2017</a:t>
+              <a:t>4/5/2017</a:t>
             </a:fld>
             <a:endParaRPr lang="en-US"/>
           </a:p>
@@ -654,7 +654,7 @@
           <a:p>
             <a:fld id="{78C97017-6FC3-485B-9764-EAC9E56C1D49}" type="datetimeFigureOut">
               <a:rPr lang="en-US" smtClean="0"/>
-              <a:t>3/17/2017</a:t>
+              <a:t>4/5/2017</a:t>
             </a:fld>
             <a:endParaRPr lang="en-US"/>
           </a:p>
@@ -822,7 +822,7 @@
           <a:p>
             <a:fld id="{78C97017-6FC3-485B-9764-EAC9E56C1D49}" type="datetimeFigureOut">
               <a:rPr lang="en-US" smtClean="0"/>
-              <a:t>3/17/2017</a:t>
+              <a:t>4/5/2017</a:t>
             </a:fld>
             <a:endParaRPr lang="en-US"/>
           </a:p>
@@ -1000,7 +1000,7 @@
           <a:p>
             <a:fld id="{78C97017-6FC3-485B-9764-EAC9E56C1D49}" type="datetimeFigureOut">
               <a:rPr lang="en-US" smtClean="0"/>
-              <a:t>3/17/2017</a:t>
+              <a:t>4/5/2017</a:t>
             </a:fld>
             <a:endParaRPr lang="en-US"/>
           </a:p>
@@ -1168,7 +1168,7 @@
           <a:p>
             <a:fld id="{78C97017-6FC3-485B-9764-EAC9E56C1D49}" type="datetimeFigureOut">
               <a:rPr lang="en-US" smtClean="0"/>
-              <a:t>3/17/2017</a:t>
+              <a:t>4/5/2017</a:t>
             </a:fld>
             <a:endParaRPr lang="en-US"/>
           </a:p>
@@ -1413,7 +1413,7 @@
           <a:p>
             <a:fld id="{78C97017-6FC3-485B-9764-EAC9E56C1D49}" type="datetimeFigureOut">
               <a:rPr lang="en-US" smtClean="0"/>
-              <a:t>3/17/2017</a:t>
+              <a:t>4/5/2017</a:t>
             </a:fld>
             <a:endParaRPr lang="en-US"/>
           </a:p>
@@ -1698,7 +1698,7 @@
           <a:p>
             <a:fld id="{78C97017-6FC3-485B-9764-EAC9E56C1D49}" type="datetimeFigureOut">
               <a:rPr lang="en-US" smtClean="0"/>
-              <a:t>3/17/2017</a:t>
+              <a:t>4/5/2017</a:t>
             </a:fld>
             <a:endParaRPr lang="en-US"/>
           </a:p>
@@ -2117,7 +2117,7 @@
           <a:p>
             <a:fld id="{78C97017-6FC3-485B-9764-EAC9E56C1D49}" type="datetimeFigureOut">
               <a:rPr lang="en-US" smtClean="0"/>
-              <a:t>3/17/2017</a:t>
+              <a:t>4/5/2017</a:t>
             </a:fld>
             <a:endParaRPr lang="en-US"/>
           </a:p>
@@ -2234,7 +2234,7 @@
           <a:p>
             <a:fld id="{78C97017-6FC3-485B-9764-EAC9E56C1D49}" type="datetimeFigureOut">
               <a:rPr lang="en-US" smtClean="0"/>
-              <a:t>3/17/2017</a:t>
+              <a:t>4/5/2017</a:t>
             </a:fld>
             <a:endParaRPr lang="en-US"/>
           </a:p>
@@ -2329,7 +2329,7 @@
           <a:p>
             <a:fld id="{78C97017-6FC3-485B-9764-EAC9E56C1D49}" type="datetimeFigureOut">
               <a:rPr lang="en-US" smtClean="0"/>
-              <a:t>3/17/2017</a:t>
+              <a:t>4/5/2017</a:t>
             </a:fld>
             <a:endParaRPr lang="en-US"/>
           </a:p>
@@ -2604,7 +2604,7 @@
           <a:p>
             <a:fld id="{78C97017-6FC3-485B-9764-EAC9E56C1D49}" type="datetimeFigureOut">
               <a:rPr lang="en-US" smtClean="0"/>
-              <a:t>3/17/2017</a:t>
+              <a:t>4/5/2017</a:t>
             </a:fld>
             <a:endParaRPr lang="en-US"/>
           </a:p>
@@ -2856,7 +2856,7 @@
           <a:p>
             <a:fld id="{78C97017-6FC3-485B-9764-EAC9E56C1D49}" type="datetimeFigureOut">
               <a:rPr lang="en-US" smtClean="0"/>
-              <a:t>3/17/2017</a:t>
+              <a:t>4/5/2017</a:t>
             </a:fld>
             <a:endParaRPr lang="en-US"/>
           </a:p>
@@ -3067,7 +3067,7 @@
           <a:p>
             <a:fld id="{78C97017-6FC3-485B-9764-EAC9E56C1D49}" type="datetimeFigureOut">
               <a:rPr lang="en-US" smtClean="0"/>
-              <a:t>3/17/2017</a:t>
+              <a:t>4/5/2017</a:t>
             </a:fld>
             <a:endParaRPr lang="en-US"/>
           </a:p>
@@ -4045,17 +4045,7 @@
                   </a:schemeClr>
                 </a:solidFill>
               </a:rPr>
-              <a:t>Task</a:t>
-            </a:r>
-            <a:r>
-              <a:rPr lang="en-US" sz="1050" b="1" dirty="0" err="1" smtClean="0">
-                <a:solidFill>
-                  <a:schemeClr val="accent3">
-                    <a:lumMod val="75000"/>
-                  </a:schemeClr>
-                </a:solidFill>
-              </a:rPr>
-              <a:t>ListPanel</a:t>
+              <a:t>TaskListPanel</a:t>
             </a:r>
             <a:endParaRPr lang="en-SG" sz="1050" b="1" dirty="0">
               <a:solidFill>
@@ -4115,17 +4105,7 @@
                   </a:schemeClr>
                 </a:solidFill>
               </a:rPr>
-              <a:t>Task</a:t>
-            </a:r>
-            <a:r>
-              <a:rPr lang="en-US" sz="1050" b="1" smtClean="0">
-                <a:solidFill>
-                  <a:schemeClr val="accent3">
-                    <a:lumMod val="75000"/>
-                  </a:schemeClr>
-                </a:solidFill>
-              </a:rPr>
-              <a:t>Card</a:t>
+              <a:t>TaskCard</a:t>
             </a:r>
             <a:endParaRPr lang="en-SG" sz="1050" b="1" dirty="0">
               <a:solidFill>
@@ -5526,6 +5506,155 @@
           <a:p>
             <a:pPr algn="ctr"/>
             <a:endParaRPr lang="en-SG"/>
+          </a:p>
+        </p:txBody>
+      </p:sp>
+      <p:sp>
+        <p:nvSpPr>
+          <p:cNvPr id="42" name="Flowchart: Decision 41"/>
+          <p:cNvSpPr/>
+          <p:nvPr/>
+        </p:nvSpPr>
+        <p:spPr>
+          <a:xfrm>
+            <a:off x="4287129" y="4057077"/>
+            <a:ext cx="183156" cy="161573"/>
+          </a:xfrm>
+          <a:prstGeom prst="flowChartDecision">
+            <a:avLst/>
+          </a:prstGeom>
+          <a:solidFill>
+            <a:schemeClr val="accent3"/>
+          </a:solidFill>
+          <a:ln>
+            <a:solidFill>
+              <a:schemeClr val="accent3"/>
+            </a:solidFill>
+          </a:ln>
+        </p:spPr>
+        <p:style>
+          <a:lnRef idx="2">
+            <a:schemeClr val="accent1">
+              <a:shade val="50000"/>
+            </a:schemeClr>
+          </a:lnRef>
+          <a:fillRef idx="1">
+            <a:schemeClr val="accent1"/>
+          </a:fillRef>
+          <a:effectRef idx="0">
+            <a:schemeClr val="accent1"/>
+          </a:effectRef>
+          <a:fontRef idx="minor">
+            <a:schemeClr val="lt1"/>
+          </a:fontRef>
+        </p:style>
+        <p:txBody>
+          <a:bodyPr rtlCol="0" anchor="ctr"/>
+          <a:lstStyle/>
+          <a:p>
+            <a:pPr algn="ctr"/>
+            <a:endParaRPr lang="en-SG"/>
+          </a:p>
+        </p:txBody>
+      </p:sp>
+      <p:cxnSp>
+        <p:nvCxnSpPr>
+          <p:cNvPr id="45" name="Elbow Connector 44"/>
+          <p:cNvCxnSpPr>
+            <a:stCxn id="42" idx="0"/>
+            <a:endCxn id="46" idx="1"/>
+          </p:cNvCxnSpPr>
+          <p:nvPr/>
+        </p:nvCxnSpPr>
+        <p:spPr>
+          <a:xfrm rot="5400000" flipH="1" flipV="1">
+            <a:off x="4470178" y="3863836"/>
+            <a:ext cx="101771" cy="284713"/>
+          </a:xfrm>
+          <a:prstGeom prst="bentConnector2">
+            <a:avLst/>
+          </a:prstGeom>
+          <a:ln w="19050">
+            <a:solidFill>
+              <a:schemeClr val="accent3"/>
+            </a:solidFill>
+            <a:headEnd type="none" w="med" len="med"/>
+            <a:tailEnd type="arrow" w="med" len="med"/>
+          </a:ln>
+          <a:effectLst/>
+        </p:spPr>
+        <p:style>
+          <a:lnRef idx="1">
+            <a:schemeClr val="accent2"/>
+          </a:lnRef>
+          <a:fillRef idx="2">
+            <a:schemeClr val="accent2"/>
+          </a:fillRef>
+          <a:effectRef idx="1">
+            <a:schemeClr val="accent2"/>
+          </a:effectRef>
+          <a:fontRef idx="minor">
+            <a:schemeClr val="dk1"/>
+          </a:fontRef>
+        </p:style>
+      </p:cxnSp>
+      <p:sp>
+        <p:nvSpPr>
+          <p:cNvPr id="46" name="Rectangle 11"/>
+          <p:cNvSpPr/>
+          <p:nvPr/>
+        </p:nvSpPr>
+        <p:spPr>
+          <a:xfrm>
+            <a:off x="4663420" y="3836885"/>
+            <a:ext cx="1040906" cy="236841"/>
+          </a:xfrm>
+          <a:prstGeom prst="rect">
+            <a:avLst/>
+          </a:prstGeom>
+          <a:ln w="19050">
+            <a:solidFill>
+              <a:schemeClr val="accent3"/>
+            </a:solidFill>
+          </a:ln>
+          <a:effectLst/>
+        </p:spPr>
+        <p:style>
+          <a:lnRef idx="1">
+            <a:schemeClr val="accent3"/>
+          </a:lnRef>
+          <a:fillRef idx="2">
+            <a:schemeClr val="accent3"/>
+          </a:fillRef>
+          <a:effectRef idx="1">
+            <a:schemeClr val="accent3"/>
+          </a:effectRef>
+          <a:fontRef idx="minor">
+            <a:schemeClr val="dk1"/>
+          </a:fontRef>
+        </p:style>
+        <p:txBody>
+          <a:bodyPr rtlCol="0" anchor="ctr"/>
+          <a:lstStyle/>
+          <a:p>
+            <a:pPr algn="ctr"/>
+            <a:r>
+              <a:rPr lang="en-US" sz="1050" b="1" dirty="0" err="1" smtClean="0">
+                <a:solidFill>
+                  <a:schemeClr val="accent3">
+                    <a:lumMod val="75000"/>
+                  </a:schemeClr>
+                </a:solidFill>
+              </a:rPr>
+              <a:t>TaskCardsStyle</a:t>
+            </a:r>
+            <a:endParaRPr lang="en-SG" sz="1050" b="1" dirty="0">
+              <a:solidFill>
+                <a:schemeClr val="accent3">
+                  <a:lumMod val="75000"/>
+                </a:schemeClr>
+              </a:solidFill>
+            </a:endParaRPr>
           </a:p>
         </p:txBody>
       </p:sp>

</xml_diff>